<commit_message>
update process in 13/8
</commit_message>
<xml_diff>
--- a/FW/Phuc/WEEK3_wifi login_mqtt info/TEMPLATE SLITE Wifi login.pptx
+++ b/FW/Phuc/WEEK3_wifi login_mqtt info/TEMPLATE SLITE Wifi login.pptx
@@ -242,7 +242,7 @@
           <a:p>
             <a:fld id="{BE921E71-55FB-4F70-BA64-7E87629B9540}" type="datetimeFigureOut">
               <a:rPr lang="en-US" smtClean="0"/>
-              <a:t>8/3/2020</a:t>
+              <a:t>8/4/2020</a:t>
             </a:fld>
             <a:endParaRPr lang="en-US"/>
           </a:p>
@@ -3300,7 +3300,7 @@
           <a:p>
             <a:fld id="{6D9FEF56-C5D4-4D87-B961-211842A8ECEA}" type="datetime1">
               <a:rPr lang="en-US" smtClean="0"/>
-              <a:t>8/3/2020</a:t>
+              <a:t>8/4/2020</a:t>
             </a:fld>
             <a:endParaRPr lang="en-US"/>
           </a:p>
@@ -5070,10 +5070,6 @@
               </a:rPr>
               <a:t>Lấy giá trị mặc định của ssid và password của access point</a:t>
             </a:r>
-            <a:endParaRPr lang="en-US" sz="2400" dirty="0" smtClean="0">
-              <a:latin typeface="Times New Roman" panose="02020603050405020304" pitchFamily="18" charset="0"/>
-              <a:cs typeface="Times New Roman" panose="02020603050405020304" pitchFamily="18" charset="0"/>
-            </a:endParaRPr>
           </a:p>
         </p:txBody>
       </p:sp>
@@ -6818,10 +6814,6 @@
               </a:rPr>
               <a:t>Đóng mode wifi station</a:t>
             </a:r>
-            <a:endParaRPr lang="en-US" sz="2400" dirty="0" smtClean="0">
-              <a:latin typeface="Times New Roman" panose="02020603050405020304" pitchFamily="18" charset="0"/>
-              <a:cs typeface="Times New Roman" panose="02020603050405020304" pitchFamily="18" charset="0"/>
-            </a:endParaRPr>
           </a:p>
           <a:p>
             <a:pPr marL="342900" indent="-342900">
@@ -10943,26 +10935,7 @@
                 <a:latin typeface="Times New Roman" panose="02020603050405020304" pitchFamily="18" charset="0"/>
                 <a:cs typeface="Times New Roman" panose="02020603050405020304" pitchFamily="18" charset="0"/>
               </a:rPr>
-              <a:t>PART </a:t>
-            </a:r>
-            <a:r>
-              <a:rPr lang="en-US" sz="6000" b="1" dirty="0">
-                <a:ln w="22225">
-                  <a:solidFill>
-                    <a:schemeClr val="accent2"/>
-                  </a:solidFill>
-                  <a:prstDash val="solid"/>
-                </a:ln>
-                <a:solidFill>
-                  <a:schemeClr val="accent2">
-                    <a:lumMod val="40000"/>
-                    <a:lumOff val="60000"/>
-                  </a:schemeClr>
-                </a:solidFill>
-                <a:latin typeface="Times New Roman" panose="02020603050405020304" pitchFamily="18" charset="0"/>
-                <a:cs typeface="Times New Roman" panose="02020603050405020304" pitchFamily="18" charset="0"/>
-              </a:rPr>
-              <a:t>3</a:t>
+              <a:t>PART 3</a:t>
             </a:r>
             <a:r>
               <a:rPr lang="en-US" sz="6000" b="1" dirty="0" smtClean="0">
@@ -10983,22 +10956,6 @@
               </a:rPr>
               <a:t>:</a:t>
             </a:r>
-            <a:endParaRPr lang="en-US" sz="6000" b="1" dirty="0" smtClean="0">
-              <a:ln w="22225">
-                <a:solidFill>
-                  <a:schemeClr val="accent2"/>
-                </a:solidFill>
-                <a:prstDash val="solid"/>
-              </a:ln>
-              <a:solidFill>
-                <a:schemeClr val="accent2">
-                  <a:lumMod val="40000"/>
-                  <a:lumOff val="60000"/>
-                </a:schemeClr>
-              </a:solidFill>
-              <a:latin typeface="Times New Roman" panose="02020603050405020304" pitchFamily="18" charset="0"/>
-              <a:cs typeface="Times New Roman" panose="02020603050405020304" pitchFamily="18" charset="0"/>
-            </a:endParaRPr>
           </a:p>
           <a:p>
             <a:pPr algn="ctr"/>
@@ -11021,22 +10978,6 @@
               </a:rPr>
               <a:t>SET MQTT &amp; PRINT</a:t>
             </a:r>
-            <a:endParaRPr lang="en-US" sz="6000" b="1" dirty="0" smtClean="0">
-              <a:ln w="22225">
-                <a:solidFill>
-                  <a:schemeClr val="accent2"/>
-                </a:solidFill>
-                <a:prstDash val="solid"/>
-              </a:ln>
-              <a:solidFill>
-                <a:schemeClr val="accent2">
-                  <a:lumMod val="40000"/>
-                  <a:lumOff val="60000"/>
-                </a:schemeClr>
-              </a:solidFill>
-              <a:latin typeface="Times New Roman" panose="02020603050405020304" pitchFamily="18" charset="0"/>
-              <a:cs typeface="Times New Roman" panose="02020603050405020304" pitchFamily="18" charset="0"/>
-            </a:endParaRPr>
           </a:p>
         </p:txBody>
       </p:sp>
@@ -11213,20 +11154,6 @@
               </a:rPr>
               <a:t>3.1.1 GIAO DIỆN</a:t>
             </a:r>
-            <a:endParaRPr lang="en-US" sz="2400" b="1" dirty="0" smtClean="0">
-              <a:solidFill>
-                <a:srgbClr val="1B8FAD"/>
-              </a:solidFill>
-              <a:effectLst>
-                <a:outerShdw blurRad="38100" dist="38100" dir="2700000" algn="tl">
-                  <a:srgbClr val="000000">
-                    <a:alpha val="43137"/>
-                  </a:srgbClr>
-                </a:outerShdw>
-              </a:effectLst>
-              <a:latin typeface="Times New Roman" panose="02020603050405020304" pitchFamily="18" charset="0"/>
-              <a:cs typeface="Times New Roman" panose="02020603050405020304" pitchFamily="18" charset="0"/>
-            </a:endParaRPr>
           </a:p>
         </p:txBody>
       </p:sp>
@@ -11246,7 +11173,7 @@
         </p:blipFill>
         <p:spPr>
           <a:xfrm>
-            <a:off x="3832269" y="1753349"/>
+            <a:off x="6080685" y="1753349"/>
             <a:ext cx="2925700" cy="5113305"/>
           </a:xfrm>
           <a:prstGeom prst="rect">
@@ -11270,7 +11197,7 @@
         </p:blipFill>
         <p:spPr>
           <a:xfrm>
-            <a:off x="6891200" y="1753349"/>
+            <a:off x="8911588" y="1753349"/>
             <a:ext cx="3390900" cy="3933825"/>
           </a:xfrm>
           <a:prstGeom prst="rect">
@@ -11278,6 +11205,45 @@
           </a:prstGeom>
         </p:spPr>
       </p:pic>
+      <p:sp>
+        <p:nvSpPr>
+          <p:cNvPr id="7" name="Rectangle 6"/>
+          <p:cNvSpPr/>
+          <p:nvPr/>
+        </p:nvSpPr>
+        <p:spPr>
+          <a:xfrm>
+            <a:off x="1623331" y="1738858"/>
+            <a:ext cx="4594589" cy="1200329"/>
+          </a:xfrm>
+          <a:prstGeom prst="rect">
+            <a:avLst/>
+          </a:prstGeom>
+        </p:spPr>
+        <p:txBody>
+          <a:bodyPr wrap="square">
+            <a:spAutoFit/>
+          </a:bodyPr>
+          <a:lstStyle/>
+          <a:p>
+            <a:pPr marL="342900" indent="-342900">
+              <a:buFont typeface="Arial" panose="020B0604020202020204" pitchFamily="34" charset="0"/>
+              <a:buChar char="•"/>
+            </a:pPr>
+            <a:r>
+              <a:rPr lang="en-US" sz="2400" smtClean="0">
+                <a:latin typeface="Times New Roman" panose="02020603050405020304" pitchFamily="18" charset="0"/>
+                <a:cs typeface="Times New Roman" panose="02020603050405020304" pitchFamily="18" charset="0"/>
+              </a:rPr>
+              <a:t>Lưu ý conf wifi và MQTT trong access point trước khi xử lý các task khác như websever,...</a:t>
+            </a:r>
+            <a:endParaRPr lang="en-US" sz="2400" dirty="0">
+              <a:latin typeface="Times New Roman" panose="02020603050405020304" pitchFamily="18" charset="0"/>
+              <a:cs typeface="Times New Roman" panose="02020603050405020304" pitchFamily="18" charset="0"/>
+            </a:endParaRPr>
+          </a:p>
+        </p:txBody>
+      </p:sp>
     </p:spTree>
     <p:extLst>
       <p:ext uri="{BB962C8B-B14F-4D97-AF65-F5344CB8AC3E}">
@@ -11451,20 +11417,6 @@
               </a:rPr>
               <a:t>3.1.2 DEFAULT</a:t>
             </a:r>
-            <a:endParaRPr lang="en-US" sz="2400" b="1" dirty="0" smtClean="0">
-              <a:solidFill>
-                <a:srgbClr val="1B8FAD"/>
-              </a:solidFill>
-              <a:effectLst>
-                <a:outerShdw blurRad="38100" dist="38100" dir="2700000" algn="tl">
-                  <a:srgbClr val="000000">
-                    <a:alpha val="43137"/>
-                  </a:srgbClr>
-                </a:outerShdw>
-              </a:effectLst>
-              <a:latin typeface="Times New Roman" panose="02020603050405020304" pitchFamily="18" charset="0"/>
-              <a:cs typeface="Times New Roman" panose="02020603050405020304" pitchFamily="18" charset="0"/>
-            </a:endParaRPr>
           </a:p>
         </p:txBody>
       </p:sp>
@@ -11907,20 +11859,6 @@
               </a:rPr>
               <a:t>3.1.3 CALL FILE</a:t>
             </a:r>
-            <a:endParaRPr lang="en-US" sz="2400" b="1" dirty="0" smtClean="0">
-              <a:solidFill>
-                <a:srgbClr val="1B8FAD"/>
-              </a:solidFill>
-              <a:effectLst>
-                <a:outerShdw blurRad="38100" dist="38100" dir="2700000" algn="tl">
-                  <a:srgbClr val="000000">
-                    <a:alpha val="43137"/>
-                  </a:srgbClr>
-                </a:outerShdw>
-              </a:effectLst>
-              <a:latin typeface="Times New Roman" panose="02020603050405020304" pitchFamily="18" charset="0"/>
-              <a:cs typeface="Times New Roman" panose="02020603050405020304" pitchFamily="18" charset="0"/>
-            </a:endParaRPr>
           </a:p>
         </p:txBody>
       </p:sp>
@@ -12212,20 +12150,6 @@
               </a:rPr>
               <a:t>3.1.4 GET DATA</a:t>
             </a:r>
-            <a:endParaRPr lang="en-US" sz="2400" b="1" dirty="0" smtClean="0">
-              <a:solidFill>
-                <a:srgbClr val="1B8FAD"/>
-              </a:solidFill>
-              <a:effectLst>
-                <a:outerShdw blurRad="38100" dist="38100" dir="2700000" algn="tl">
-                  <a:srgbClr val="000000">
-                    <a:alpha val="43137"/>
-                  </a:srgbClr>
-                </a:outerShdw>
-              </a:effectLst>
-              <a:latin typeface="Times New Roman" panose="02020603050405020304" pitchFamily="18" charset="0"/>
-              <a:cs typeface="Times New Roman" panose="02020603050405020304" pitchFamily="18" charset="0"/>
-            </a:endParaRPr>
           </a:p>
         </p:txBody>
       </p:sp>
@@ -12474,20 +12398,6 @@
               </a:rPr>
               <a:t>3.1.5 PARAMETER</a:t>
             </a:r>
-            <a:endParaRPr lang="en-US" sz="2400" b="1" dirty="0" smtClean="0">
-              <a:solidFill>
-                <a:srgbClr val="1B8FAD"/>
-              </a:solidFill>
-              <a:effectLst>
-                <a:outerShdw blurRad="38100" dist="38100" dir="2700000" algn="tl">
-                  <a:srgbClr val="000000">
-                    <a:alpha val="43137"/>
-                  </a:srgbClr>
-                </a:outerShdw>
-              </a:effectLst>
-              <a:latin typeface="Times New Roman" panose="02020603050405020304" pitchFamily="18" charset="0"/>
-              <a:cs typeface="Times New Roman" panose="02020603050405020304" pitchFamily="18" charset="0"/>
-            </a:endParaRPr>
           </a:p>
         </p:txBody>
       </p:sp>
@@ -12762,20 +12672,6 @@
               </a:rPr>
               <a:t>3.1.6 GET UPDATE &amp; SAVE</a:t>
             </a:r>
-            <a:endParaRPr lang="en-US" sz="2400" b="1" dirty="0" smtClean="0">
-              <a:solidFill>
-                <a:srgbClr val="1B8FAD"/>
-              </a:solidFill>
-              <a:effectLst>
-                <a:outerShdw blurRad="38100" dist="38100" dir="2700000" algn="tl">
-                  <a:srgbClr val="000000">
-                    <a:alpha val="43137"/>
-                  </a:srgbClr>
-                </a:outerShdw>
-              </a:effectLst>
-              <a:latin typeface="Times New Roman" panose="02020603050405020304" pitchFamily="18" charset="0"/>
-              <a:cs typeface="Times New Roman" panose="02020603050405020304" pitchFamily="18" charset="0"/>
-            </a:endParaRPr>
           </a:p>
         </p:txBody>
       </p:sp>
@@ -13037,20 +12933,6 @@
               </a:rPr>
               <a:t>3.1.7 CLOSE FILE </a:t>
             </a:r>
-            <a:endParaRPr lang="en-US" sz="2400" b="1" dirty="0" smtClean="0">
-              <a:solidFill>
-                <a:srgbClr val="1B8FAD"/>
-              </a:solidFill>
-              <a:effectLst>
-                <a:outerShdw blurRad="38100" dist="38100" dir="2700000" algn="tl">
-                  <a:srgbClr val="000000">
-                    <a:alpha val="43137"/>
-                  </a:srgbClr>
-                </a:outerShdw>
-              </a:effectLst>
-              <a:latin typeface="Times New Roman" panose="02020603050405020304" pitchFamily="18" charset="0"/>
-              <a:cs typeface="Times New Roman" panose="02020603050405020304" pitchFamily="18" charset="0"/>
-            </a:endParaRPr>
           </a:p>
         </p:txBody>
       </p:sp>

</xml_diff>